<commit_message>
Update First Oral Presentation.pptx
</commit_message>
<xml_diff>
--- a/First Review/First Oral Presentation.pptx
+++ b/First Review/First Oral Presentation.pptx
@@ -5187,13 +5187,19 @@
             <p:ph type="title"/>
           </p:nvPr>
         </p:nvSpPr>
-        <p:spPr/>
+        <p:spPr>
+          <a:xfrm>
+            <a:off x="838200" y="365126"/>
+            <a:ext cx="10515600" cy="1215100"/>
+          </a:xfrm>
+        </p:spPr>
         <p:txBody>
           <a:bodyPr>
             <a:normAutofit/>
           </a:bodyPr>
           <a:lstStyle/>
           <a:p>
+            <a:pPr algn="ctr"/>
             <a:r>
               <a:rPr lang="en-US" sz="3200" b="1" dirty="0">
                 <a:solidFill>
@@ -5202,8 +5208,23 @@
                   </a:schemeClr>
                 </a:solidFill>
               </a:rPr>
-              <a:t>                                           Objective</a:t>
-            </a:r>
+              <a:t> </a:t>
+            </a:r>
+            <a:r>
+              <a:rPr lang="en-IN" sz="3200" b="1" u="sng" dirty="0">
+                <a:solidFill>
+                  <a:srgbClr val="FF0000"/>
+                </a:solidFill>
+              </a:rPr>
+              <a:t>Description</a:t>
+            </a:r>
+            <a:endParaRPr lang="en-US" sz="3200" b="1" dirty="0">
+              <a:solidFill>
+                <a:schemeClr val="accent2">
+                  <a:lumMod val="75000"/>
+                </a:schemeClr>
+              </a:solidFill>
+            </a:endParaRPr>
           </a:p>
         </p:txBody>
       </p:sp>
@@ -5217,7 +5238,12 @@
             <p:ph idx="1"/>
           </p:nvPr>
         </p:nvSpPr>
-        <p:spPr/>
+        <p:spPr>
+          <a:xfrm>
+            <a:off x="838200" y="1260629"/>
+            <a:ext cx="10515600" cy="4190260"/>
+          </a:xfrm>
+        </p:spPr>
         <p:txBody>
           <a:bodyPr/>
           <a:lstStyle/>
@@ -5225,18 +5251,30 @@
             <a:endParaRPr lang="en-US" dirty="0"/>
           </a:p>
           <a:p>
+            <a:pPr>
+              <a:buFont typeface="Wingdings" panose="05000000000000000000" pitchFamily="2" charset="2"/>
+              <a:buChar char="Ø"/>
+            </a:pPr>
             <a:r>
               <a:rPr lang="en-US" dirty="0"/>
               <a:t>Power system fault diagnosis is the process of analyzing historical fault data to detect and predict current  or future fault.</a:t>
             </a:r>
           </a:p>
           <a:p>
+            <a:pPr>
+              <a:buFont typeface="Wingdings" panose="05000000000000000000" pitchFamily="2" charset="2"/>
+              <a:buChar char="Ø"/>
+            </a:pPr>
             <a:r>
               <a:rPr lang="en-US" dirty="0"/>
               <a:t>The objective of our project is to find out the faults in transmission line  and to  classify them.</a:t>
             </a:r>
           </a:p>
           <a:p>
+            <a:pPr>
+              <a:buFont typeface="Wingdings" panose="05000000000000000000" pitchFamily="2" charset="2"/>
+              <a:buChar char="Ø"/>
+            </a:pPr>
             <a:r>
               <a:rPr lang="en-US" dirty="0"/>
               <a:t>By using artificial intelligence techniques in power systems we can  identify faults effectively to minimize the time.</a:t>
@@ -5357,8 +5395,8 @@
         </p:nvSpPr>
         <p:spPr>
           <a:xfrm>
-            <a:off x="480646" y="363520"/>
-            <a:ext cx="12192000" cy="584775"/>
+            <a:off x="838200" y="354643"/>
+            <a:ext cx="10622872" cy="584775"/>
           </a:xfrm>
           <a:prstGeom prst="rect">
             <a:avLst/>
@@ -5411,7 +5449,7 @@
           </a:bodyPr>
           <a:lstStyle/>
           <a:p>
-            <a:pPr marL="342900" indent="-342900" algn="l">
+            <a:pPr marL="342900" indent="-342900" algn="just">
               <a:lnSpc>
                 <a:spcPct val="150000"/>
               </a:lnSpc>
@@ -5424,7 +5462,7 @@
             </a:r>
           </a:p>
           <a:p>
-            <a:pPr marL="342900" indent="-342900" algn="l">
+            <a:pPr marL="342900" indent="-342900" algn="just">
               <a:lnSpc>
                 <a:spcPct val="150000"/>
               </a:lnSpc>
@@ -5437,7 +5475,7 @@
             </a:r>
           </a:p>
           <a:p>
-            <a:pPr marL="342900" indent="-342900" algn="l">
+            <a:pPr marL="342900" indent="-342900" algn="just">
               <a:lnSpc>
                 <a:spcPct val="150000"/>
               </a:lnSpc>
@@ -5593,7 +5631,7 @@
           <a:bodyPr/>
           <a:lstStyle/>
           <a:p>
-            <a:pPr>
+            <a:pPr algn="just">
               <a:buFont typeface="Wingdings" panose="05000000000000000000" pitchFamily="2" charset="2"/>
               <a:buChar char="Ø"/>
             </a:pPr>
@@ -5603,7 +5641,7 @@
             </a:r>
           </a:p>
           <a:p>
-            <a:pPr>
+            <a:pPr algn="just">
               <a:buFont typeface="Wingdings" panose="05000000000000000000" pitchFamily="2" charset="2"/>
               <a:buChar char="Ø"/>
             </a:pPr>
@@ -5874,18 +5912,30 @@
           <a:bodyPr/>
           <a:lstStyle/>
           <a:p>
+            <a:pPr algn="just">
+              <a:buFont typeface="Wingdings" panose="05000000000000000000" pitchFamily="2" charset="2"/>
+              <a:buChar char="Ø"/>
+            </a:pPr>
             <a:r>
               <a:rPr lang="en-US" dirty="0"/>
               <a:t>The safety operation of power system are faced with challenges as the load increases and the scale of the grid expands.</a:t>
             </a:r>
           </a:p>
           <a:p>
+            <a:pPr algn="just">
+              <a:buFont typeface="Wingdings" panose="05000000000000000000" pitchFamily="2" charset="2"/>
+              <a:buChar char="Ø"/>
+            </a:pPr>
             <a:r>
               <a:rPr lang="en-US" dirty="0"/>
               <a:t>The faults in the power system causes large scale outage problem which leads to huge loss. </a:t>
             </a:r>
           </a:p>
           <a:p>
+            <a:pPr algn="just">
+              <a:buFont typeface="Wingdings" panose="05000000000000000000" pitchFamily="2" charset="2"/>
+              <a:buChar char="Ø"/>
+            </a:pPr>
             <a:r>
               <a:rPr lang="en-US" dirty="0"/>
               <a:t>After </a:t>

</xml_diff>